<commit_message>
Changes in PowerPoint Slide and StudentResource
</commit_message>
<xml_diff>
--- a/src/main/resources/static/docs/Apresentacao_Spring_Mail_Thymeleaf.pptx
+++ b/src/main/resources/static/docs/Apresentacao_Spring_Mail_Thymeleaf.pptx
@@ -3854,8 +3854,8 @@
               <a:buNone/>
             </a:pPr>
             <a:r>
-              <a:rPr lang="pt-BR" u="sng" dirty="0"/>
-              <a:t>22/09/2021</a:t>
+              <a:rPr lang="pt-BR" u="sng"/>
+              <a:t>25/09/2021</a:t>
             </a:r>
             <a:endParaRPr u="sng" dirty="0"/>
           </a:p>

</xml_diff>